<commit_message>
Wew, someone's working again.
</commit_message>
<xml_diff>
--- a/APPR/ITS/presents/CompTIA A+ 220-901+902/CompTIA A+ 220-901+902 (3.1+3.2).pptx
+++ b/APPR/ITS/presents/CompTIA A+ 220-901+902/CompTIA A+ 220-901+902 (3.1+3.2).pptx
@@ -7537,7 +7537,7 @@
           <a:p>
             <a:pPr algn="ctr"/>
             <a:r>
-              <a:rPr lang="de-DE" i="1" dirty="0" smtClean="0">
+              <a:rPr lang="en-GB" i="1" dirty="0" smtClean="0">
                 <a:solidFill>
                   <a:schemeClr val="tx1">
                     <a:lumMod val="65000"/>
@@ -7548,7 +7548,34 @@
                 <a:ea typeface="Fira Sans" panose="020B0503050000020004" pitchFamily="34" charset="0"/>
                 <a:cs typeface="Verdana" panose="020B0604030504040204" pitchFamily="34" charset="0"/>
               </a:rPr>
-              <a:t>BUSINESS PLAN</a:t>
+              <a:t>COMPTIA A+ </a:t>
+            </a:r>
+            <a:br>
+              <a:rPr lang="en-GB" i="1" dirty="0" smtClean="0">
+                <a:solidFill>
+                  <a:schemeClr val="tx1">
+                    <a:lumMod val="65000"/>
+                    <a:lumOff val="35000"/>
+                  </a:schemeClr>
+                </a:solidFill>
+                <a:latin typeface="Fira Sans" panose="020B0503050000020004" pitchFamily="34" charset="0"/>
+                <a:ea typeface="Fira Sans" panose="020B0503050000020004" pitchFamily="34" charset="0"/>
+                <a:cs typeface="Verdana" panose="020B0604030504040204" pitchFamily="34" charset="0"/>
+              </a:rPr>
+            </a:br>
+            <a:r>
+              <a:rPr lang="en-GB" i="1" dirty="0" smtClean="0">
+                <a:solidFill>
+                  <a:schemeClr val="tx1">
+                    <a:lumMod val="65000"/>
+                    <a:lumOff val="35000"/>
+                  </a:schemeClr>
+                </a:solidFill>
+                <a:latin typeface="Fira Sans" panose="020B0503050000020004" pitchFamily="34" charset="0"/>
+                <a:ea typeface="Fira Sans" panose="020B0503050000020004" pitchFamily="34" charset="0"/>
+                <a:cs typeface="Verdana" panose="020B0604030504040204" pitchFamily="34" charset="0"/>
+              </a:rPr>
+              <a:t>MOBILE DEVICES: 3.1 + 3.2</a:t>
             </a:r>
             <a:endParaRPr lang="de-DE" i="1" dirty="0">
               <a:solidFill>
@@ -7942,7 +7969,7 @@
           <a:lstStyle/>
           <a:p>
             <a:r>
-              <a:rPr lang="en-GB" sz="2400" i="1" dirty="0" smtClean="0">
+              <a:rPr lang="en-GB" i="1" dirty="0" err="1" smtClean="0">
                 <a:solidFill>
                   <a:schemeClr val="bg1">
                     <a:lumMod val="50000"/>
@@ -7952,10 +7979,23 @@
                 <a:ea typeface="Fira Sans" panose="020B0503050000020004" pitchFamily="34" charset="0"/>
                 <a:cs typeface="Verdana" panose="020B0604030504040204" pitchFamily="34" charset="0"/>
               </a:rPr>
-              <a:t>Was </a:t>
-            </a:r>
-            <a:r>
-              <a:rPr lang="en-GB" sz="2400" i="1" dirty="0" err="1" smtClean="0">
+              <a:t>Komponenten</a:t>
+            </a:r>
+            <a:endParaRPr lang="en-GB" i="1" dirty="0" smtClean="0">
+              <a:solidFill>
+                <a:schemeClr val="bg1">
+                  <a:lumMod val="50000"/>
+                </a:schemeClr>
+              </a:solidFill>
+              <a:latin typeface="Fira Sans" panose="020B0503050000020004" pitchFamily="34" charset="0"/>
+              <a:ea typeface="Fira Sans" panose="020B0503050000020004" pitchFamily="34" charset="0"/>
+              <a:cs typeface="Verdana" panose="020B0604030504040204" pitchFamily="34" charset="0"/>
+            </a:endParaRPr>
+          </a:p>
+          <a:p>
+            <a:pPr lvl="1"/>
+            <a:r>
+              <a:rPr lang="en-GB" i="1" dirty="0" smtClean="0">
                 <a:solidFill>
                   <a:schemeClr val="bg1">
                     <a:lumMod val="50000"/>
@@ -7965,10 +8005,77 @@
                 <a:ea typeface="Fira Sans" panose="020B0503050000020004" pitchFamily="34" charset="0"/>
                 <a:cs typeface="Verdana" panose="020B0604030504040204" pitchFamily="34" charset="0"/>
               </a:rPr>
-              <a:t>ist</a:t>
-            </a:r>
-            <a:r>
-              <a:rPr lang="en-GB" sz="2400" i="1" dirty="0" smtClean="0">
+              <a:t>Express Cards</a:t>
+            </a:r>
+          </a:p>
+          <a:p>
+            <a:pPr lvl="1"/>
+            <a:r>
+              <a:rPr lang="en-GB" i="1" dirty="0" smtClean="0">
+                <a:solidFill>
+                  <a:schemeClr val="bg1">
+                    <a:lumMod val="50000"/>
+                  </a:schemeClr>
+                </a:solidFill>
+                <a:latin typeface="Fira Sans" panose="020B0503050000020004" pitchFamily="34" charset="0"/>
+                <a:ea typeface="Fira Sans" panose="020B0503050000020004" pitchFamily="34" charset="0"/>
+                <a:cs typeface="Verdana" panose="020B0604030504040204" pitchFamily="34" charset="0"/>
+              </a:rPr>
+              <a:t>Adapters/Ports</a:t>
+            </a:r>
+            <a:endParaRPr lang="en-GB" i="1" dirty="0">
+              <a:solidFill>
+                <a:schemeClr val="bg1">
+                  <a:lumMod val="50000"/>
+                </a:schemeClr>
+              </a:solidFill>
+              <a:latin typeface="Fira Sans" panose="020B0503050000020004" pitchFamily="34" charset="0"/>
+              <a:ea typeface="Fira Sans" panose="020B0503050000020004" pitchFamily="34" charset="0"/>
+              <a:cs typeface="Verdana" panose="020B0604030504040204" pitchFamily="34" charset="0"/>
+            </a:endParaRPr>
+          </a:p>
+          <a:p>
+            <a:pPr lvl="1"/>
+            <a:endParaRPr lang="en-GB" sz="2000" i="1" dirty="0" smtClean="0">
+              <a:solidFill>
+                <a:schemeClr val="bg1">
+                  <a:lumMod val="50000"/>
+                </a:schemeClr>
+              </a:solidFill>
+              <a:latin typeface="Fira Sans" panose="020B0503050000020004" pitchFamily="34" charset="0"/>
+              <a:ea typeface="Fira Sans" panose="020B0503050000020004" pitchFamily="34" charset="0"/>
+              <a:cs typeface="Verdana" panose="020B0604030504040204" pitchFamily="34" charset="0"/>
+            </a:endParaRPr>
+          </a:p>
+          <a:p>
+            <a:r>
+              <a:rPr lang="en-GB" i="1" dirty="0" smtClean="0">
+                <a:solidFill>
+                  <a:schemeClr val="bg1">
+                    <a:lumMod val="50000"/>
+                  </a:schemeClr>
+                </a:solidFill>
+                <a:latin typeface="Fira Sans" panose="020B0503050000020004" pitchFamily="34" charset="0"/>
+                <a:ea typeface="Fira Sans" panose="020B0503050000020004" pitchFamily="34" charset="0"/>
+                <a:cs typeface="Verdana" panose="020B0604030504040204" pitchFamily="34" charset="0"/>
+              </a:rPr>
+              <a:t>Hardware/</a:t>
+            </a:r>
+            <a:r>
+              <a:rPr lang="en-GB" i="1" dirty="0" err="1" smtClean="0">
+                <a:solidFill>
+                  <a:schemeClr val="bg1">
+                    <a:lumMod val="50000"/>
+                  </a:schemeClr>
+                </a:solidFill>
+                <a:latin typeface="Fira Sans" panose="020B0503050000020004" pitchFamily="34" charset="0"/>
+                <a:ea typeface="Fira Sans" panose="020B0503050000020004" pitchFamily="34" charset="0"/>
+                <a:cs typeface="Verdana" panose="020B0604030504040204" pitchFamily="34" charset="0"/>
+              </a:rPr>
+              <a:t>austauschbare</a:t>
+            </a:r>
+            <a:r>
+              <a:rPr lang="en-GB" i="1" dirty="0" smtClean="0">
                 <a:solidFill>
                   <a:schemeClr val="bg1">
                     <a:lumMod val="50000"/>
@@ -7981,7 +8088,7 @@
               <a:t> </a:t>
             </a:r>
             <a:r>
-              <a:rPr lang="en-GB" sz="2400" i="1" dirty="0" err="1" smtClean="0">
+              <a:rPr lang="en-GB" i="1" dirty="0" err="1" smtClean="0">
                 <a:solidFill>
                   <a:schemeClr val="bg1">
                     <a:lumMod val="50000"/>
@@ -7991,10 +8098,23 @@
                 <a:ea typeface="Fira Sans" panose="020B0503050000020004" pitchFamily="34" charset="0"/>
                 <a:cs typeface="Verdana" panose="020B0604030504040204" pitchFamily="34" charset="0"/>
               </a:rPr>
-              <a:t>ein</a:t>
-            </a:r>
-            <a:r>
-              <a:rPr lang="en-GB" sz="2400" i="1" dirty="0" smtClean="0">
+              <a:t>Komponenten</a:t>
+            </a:r>
+            <a:endParaRPr lang="en-GB" i="1" dirty="0" smtClean="0">
+              <a:solidFill>
+                <a:schemeClr val="bg1">
+                  <a:lumMod val="50000"/>
+                </a:schemeClr>
+              </a:solidFill>
+              <a:latin typeface="Fira Sans" panose="020B0503050000020004" pitchFamily="34" charset="0"/>
+              <a:ea typeface="Fira Sans" panose="020B0503050000020004" pitchFamily="34" charset="0"/>
+              <a:cs typeface="Verdana" panose="020B0604030504040204" pitchFamily="34" charset="0"/>
+            </a:endParaRPr>
+          </a:p>
+          <a:p>
+            <a:pPr lvl="1"/>
+            <a:r>
+              <a:rPr lang="en-GB" i="1" dirty="0" err="1" smtClean="0">
                 <a:solidFill>
                   <a:schemeClr val="bg1">
                     <a:lumMod val="50000"/>
@@ -8004,10 +8124,23 @@
                 <a:ea typeface="Fira Sans" panose="020B0503050000020004" pitchFamily="34" charset="0"/>
                 <a:cs typeface="Verdana" panose="020B0604030504040204" pitchFamily="34" charset="0"/>
               </a:rPr>
-              <a:t> </a:t>
-            </a:r>
-            <a:r>
-              <a:rPr lang="en-GB" sz="2400" i="1" dirty="0" err="1" smtClean="0">
+              <a:t>Tastaturen</a:t>
+            </a:r>
+            <a:endParaRPr lang="en-GB" i="1" dirty="0" smtClean="0">
+              <a:solidFill>
+                <a:schemeClr val="bg1">
+                  <a:lumMod val="50000"/>
+                </a:schemeClr>
+              </a:solidFill>
+              <a:latin typeface="Fira Sans" panose="020B0503050000020004" pitchFamily="34" charset="0"/>
+              <a:ea typeface="Fira Sans" panose="020B0503050000020004" pitchFamily="34" charset="0"/>
+              <a:cs typeface="Verdana" panose="020B0604030504040204" pitchFamily="34" charset="0"/>
+            </a:endParaRPr>
+          </a:p>
+          <a:p>
+            <a:pPr lvl="1"/>
+            <a:r>
+              <a:rPr lang="en-GB" i="1" dirty="0" err="1" smtClean="0">
                 <a:solidFill>
                   <a:schemeClr val="bg1">
                     <a:lumMod val="50000"/>
@@ -8017,10 +8150,23 @@
                 <a:ea typeface="Fira Sans" panose="020B0503050000020004" pitchFamily="34" charset="0"/>
                 <a:cs typeface="Verdana" panose="020B0604030504040204" pitchFamily="34" charset="0"/>
               </a:rPr>
-              <a:t>Businessplan</a:t>
-            </a:r>
-            <a:r>
-              <a:rPr lang="en-GB" sz="2400" i="1" dirty="0" smtClean="0">
+              <a:t>Speichermedien</a:t>
+            </a:r>
+            <a:endParaRPr lang="en-GB" i="1" dirty="0" smtClean="0">
+              <a:solidFill>
+                <a:schemeClr val="bg1">
+                  <a:lumMod val="50000"/>
+                </a:schemeClr>
+              </a:solidFill>
+              <a:latin typeface="Fira Sans" panose="020B0503050000020004" pitchFamily="34" charset="0"/>
+              <a:ea typeface="Fira Sans" panose="020B0503050000020004" pitchFamily="34" charset="0"/>
+              <a:cs typeface="Verdana" panose="020B0604030504040204" pitchFamily="34" charset="0"/>
+            </a:endParaRPr>
+          </a:p>
+          <a:p>
+            <a:pPr lvl="1"/>
+            <a:r>
+              <a:rPr lang="en-GB" i="1" dirty="0" smtClean="0">
                 <a:solidFill>
                   <a:schemeClr val="bg1">
                     <a:lumMod val="50000"/>
@@ -8030,13 +8176,13 @@
                 <a:ea typeface="Fira Sans" panose="020B0503050000020004" pitchFamily="34" charset="0"/>
                 <a:cs typeface="Verdana" panose="020B0604030504040204" pitchFamily="34" charset="0"/>
               </a:rPr>
-              <a:t>?</a:t>
+              <a:t>Memory</a:t>
             </a:r>
           </a:p>
           <a:p>
             <a:pPr lvl="1"/>
             <a:r>
-              <a:rPr lang="en-GB" sz="2000" i="1" dirty="0" smtClean="0">
+              <a:rPr lang="en-GB" i="1" dirty="0" err="1" smtClean="0">
                 <a:solidFill>
                   <a:schemeClr val="bg1">
                     <a:lumMod val="50000"/>
@@ -8046,13 +8192,23 @@
                 <a:ea typeface="Fira Sans" panose="020B0503050000020004" pitchFamily="34" charset="0"/>
                 <a:cs typeface="Verdana" panose="020B0604030504040204" pitchFamily="34" charset="0"/>
               </a:rPr>
-              <a:t>Zielsetzung</a:t>
-            </a:r>
+              <a:t>Bildschirm</a:t>
+            </a:r>
+            <a:endParaRPr lang="en-GB" i="1" dirty="0" smtClean="0">
+              <a:solidFill>
+                <a:schemeClr val="bg1">
+                  <a:lumMod val="50000"/>
+                </a:schemeClr>
+              </a:solidFill>
+              <a:latin typeface="Fira Sans" panose="020B0503050000020004" pitchFamily="34" charset="0"/>
+              <a:ea typeface="Fira Sans" panose="020B0503050000020004" pitchFamily="34" charset="0"/>
+              <a:cs typeface="Verdana" panose="020B0604030504040204" pitchFamily="34" charset="0"/>
+            </a:endParaRPr>
           </a:p>
           <a:p>
             <a:pPr lvl="1"/>
             <a:r>
-              <a:rPr lang="en-GB" sz="2000" i="1" dirty="0" smtClean="0">
+              <a:rPr lang="en-GB" i="1" dirty="0" err="1" smtClean="0">
                 <a:solidFill>
                   <a:schemeClr val="bg1">
                     <a:lumMod val="50000"/>
@@ -8062,13 +8218,23 @@
                 <a:ea typeface="Fira Sans" panose="020B0503050000020004" pitchFamily="34" charset="0"/>
                 <a:cs typeface="Verdana" panose="020B0604030504040204" pitchFamily="34" charset="0"/>
               </a:rPr>
-              <a:t>Planung</a:t>
-            </a:r>
+              <a:t>Akkumulator</a:t>
+            </a:r>
+            <a:endParaRPr lang="en-GB" i="1" dirty="0" smtClean="0">
+              <a:solidFill>
+                <a:schemeClr val="bg1">
+                  <a:lumMod val="50000"/>
+                </a:schemeClr>
+              </a:solidFill>
+              <a:latin typeface="Fira Sans" panose="020B0503050000020004" pitchFamily="34" charset="0"/>
+              <a:ea typeface="Fira Sans" panose="020B0503050000020004" pitchFamily="34" charset="0"/>
+              <a:cs typeface="Verdana" panose="020B0604030504040204" pitchFamily="34" charset="0"/>
+            </a:endParaRPr>
           </a:p>
           <a:p>
             <a:pPr lvl="1"/>
             <a:r>
-              <a:rPr lang="en-GB" sz="2000" i="1" dirty="0" smtClean="0">
+              <a:rPr lang="en-GB" i="1" dirty="0" smtClean="0">
                 <a:solidFill>
                   <a:schemeClr val="bg1">
                     <a:lumMod val="50000"/>
@@ -8078,128 +8244,12 @@
                 <a:ea typeface="Fira Sans" panose="020B0503050000020004" pitchFamily="34" charset="0"/>
                 <a:cs typeface="Verdana" panose="020B0604030504040204" pitchFamily="34" charset="0"/>
               </a:rPr>
-              <a:t>Erfolgsabschätzung</a:t>
+              <a:t>Touchpad</a:t>
             </a:r>
           </a:p>
           <a:p>
             <a:pPr lvl="1"/>
-            <a:endParaRPr lang="en-GB" sz="1600" i="1" dirty="0" smtClean="0">
-              <a:solidFill>
-                <a:schemeClr val="bg1">
-                  <a:lumMod val="65000"/>
-                </a:schemeClr>
-              </a:solidFill>
-              <a:latin typeface="Fira Sans" panose="020B0503050000020004" pitchFamily="34" charset="0"/>
-              <a:ea typeface="Fira Sans" panose="020B0503050000020004" pitchFamily="34" charset="0"/>
-              <a:cs typeface="Verdana" panose="020B0604030504040204" pitchFamily="34" charset="0"/>
-            </a:endParaRPr>
-          </a:p>
-          <a:p>
-            <a:r>
-              <a:rPr lang="en-GB" sz="2400" i="1" dirty="0" smtClean="0">
-                <a:solidFill>
-                  <a:schemeClr val="bg1">
-                    <a:lumMod val="50000"/>
-                  </a:schemeClr>
-                </a:solidFill>
-                <a:latin typeface="Fira Sans" panose="020B0503050000020004" pitchFamily="34" charset="0"/>
-                <a:ea typeface="Fira Sans" panose="020B0503050000020004" pitchFamily="34" charset="0"/>
-                <a:cs typeface="Verdana" panose="020B0604030504040204" pitchFamily="34" charset="0"/>
-              </a:rPr>
-              <a:t>Wie?</a:t>
-            </a:r>
-          </a:p>
-          <a:p>
-            <a:pPr lvl="1"/>
-            <a:r>
-              <a:rPr lang="en-GB" sz="2000" i="1" dirty="0">
-                <a:solidFill>
-                  <a:schemeClr val="bg1">
-                    <a:lumMod val="50000"/>
-                  </a:schemeClr>
-                </a:solidFill>
-                <a:latin typeface="Fira Sans" panose="020B0503050000020004" pitchFamily="34" charset="0"/>
-                <a:ea typeface="Fira Sans" panose="020B0503050000020004" pitchFamily="34" charset="0"/>
-                <a:cs typeface="Verdana" panose="020B0604030504040204" pitchFamily="34" charset="0"/>
-              </a:rPr>
-              <a:t>Welche Information wird benötigt?</a:t>
-            </a:r>
-          </a:p>
-          <a:p>
-            <a:pPr lvl="1"/>
-            <a:r>
-              <a:rPr lang="en-GB" sz="2000" i="1" dirty="0">
-                <a:solidFill>
-                  <a:schemeClr val="bg1">
-                    <a:lumMod val="50000"/>
-                  </a:schemeClr>
-                </a:solidFill>
-                <a:latin typeface="Fira Sans" panose="020B0503050000020004" pitchFamily="34" charset="0"/>
-                <a:ea typeface="Fira Sans" panose="020B0503050000020004" pitchFamily="34" charset="0"/>
-                <a:cs typeface="Verdana" panose="020B0604030504040204" pitchFamily="34" charset="0"/>
-              </a:rPr>
-              <a:t>Woher bekomme ich diese?</a:t>
-            </a:r>
-          </a:p>
-          <a:p>
-            <a:pPr lvl="1"/>
-            <a:r>
-              <a:rPr lang="en-GB" sz="2000" i="1" dirty="0">
-                <a:solidFill>
-                  <a:schemeClr val="bg1">
-                    <a:lumMod val="50000"/>
-                  </a:schemeClr>
-                </a:solidFill>
-                <a:latin typeface="Fira Sans" panose="020B0503050000020004" pitchFamily="34" charset="0"/>
-                <a:ea typeface="Fira Sans" panose="020B0503050000020004" pitchFamily="34" charset="0"/>
-                <a:cs typeface="Verdana" panose="020B0604030504040204" pitchFamily="34" charset="0"/>
-              </a:rPr>
-              <a:t>Wie stelle ich diese dar</a:t>
-            </a:r>
-            <a:r>
-              <a:rPr lang="en-GB" sz="2000" i="1" dirty="0" smtClean="0">
-                <a:solidFill>
-                  <a:schemeClr val="bg1">
-                    <a:lumMod val="50000"/>
-                  </a:schemeClr>
-                </a:solidFill>
-                <a:latin typeface="Fira Sans" panose="020B0503050000020004" pitchFamily="34" charset="0"/>
-                <a:ea typeface="Fira Sans" panose="020B0503050000020004" pitchFamily="34" charset="0"/>
-                <a:cs typeface="Verdana" panose="020B0604030504040204" pitchFamily="34" charset="0"/>
-              </a:rPr>
-              <a:t>?</a:t>
-            </a:r>
-          </a:p>
-          <a:p>
-            <a:pPr marL="457200" lvl="1" indent="0">
-              <a:buNone/>
-            </a:pPr>
-            <a:endParaRPr lang="en-GB" sz="2000" i="1" dirty="0" smtClean="0">
-              <a:solidFill>
-                <a:schemeClr val="bg1">
-                  <a:lumMod val="50000"/>
-                </a:schemeClr>
-              </a:solidFill>
-              <a:latin typeface="Fira Sans" panose="020B0503050000020004" pitchFamily="34" charset="0"/>
-              <a:ea typeface="Fira Sans" panose="020B0503050000020004" pitchFamily="34" charset="0"/>
-              <a:cs typeface="Verdana" panose="020B0604030504040204" pitchFamily="34" charset="0"/>
-            </a:endParaRPr>
-          </a:p>
-          <a:p>
-            <a:r>
-              <a:rPr lang="en-GB" sz="2400" i="1" dirty="0" err="1" smtClean="0">
-                <a:solidFill>
-                  <a:schemeClr val="bg1">
-                    <a:lumMod val="50000"/>
-                  </a:schemeClr>
-                </a:solidFill>
-                <a:latin typeface="Fira Sans" panose="020B0503050000020004" pitchFamily="34" charset="0"/>
-                <a:ea typeface="Fira Sans" panose="020B0503050000020004" pitchFamily="34" charset="0"/>
-                <a:cs typeface="Verdana" panose="020B0604030504040204" pitchFamily="34" charset="0"/>
-              </a:rPr>
-              <a:t>Zusammensetzung</a:t>
-            </a:r>
-            <a:endParaRPr lang="en-GB" sz="2400" i="1" dirty="0" smtClean="0">
+            <a:endParaRPr lang="en-GB" i="1" dirty="0">
               <a:solidFill>
                 <a:schemeClr val="bg1">
                   <a:lumMod val="50000"/>

</xml_diff>